<commit_message>
Continuação do trabalho de UX.
</commit_message>
<xml_diff>
--- a/Análise ERP WEB BioSistema.pptx
+++ b/Análise ERP WEB BioSistema.pptx
@@ -5,12 +5,14 @@
     <p:sldMasterId id="2147483648" r:id="rId1"/>
   </p:sldMasterIdLst>
   <p:notesMasterIdLst>
-    <p:notesMasterId r:id="rId5"/>
+    <p:notesMasterId r:id="rId7"/>
   </p:notesMasterIdLst>
   <p:sldIdLst>
     <p:sldId id="258" r:id="rId2"/>
     <p:sldId id="259" r:id="rId3"/>
-    <p:sldId id="260" r:id="rId4"/>
+    <p:sldId id="261" r:id="rId4"/>
+    <p:sldId id="260" r:id="rId5"/>
+    <p:sldId id="262" r:id="rId6"/>
   </p:sldIdLst>
   <p:sldSz cx="9144000" cy="6858000" type="screen4x3"/>
   <p:notesSz cx="6858000" cy="9144000"/>
@@ -194,7 +196,7 @@
           <a:p>
             <a:fld id="{6243CB1A-BA5C-4C34-AC0C-90CC0C1B0E03}" type="datetimeFigureOut">
               <a:rPr lang="pt-BR" smtClean="0"/>
-              <a:t>29/05/2023</a:t>
+              <a:t>30/05/2023</a:t>
             </a:fld>
             <a:endParaRPr lang="pt-BR" dirty="0"/>
           </a:p>
@@ -546,6 +548,538 @@
 </p:notes>
 </file>
 
+<file path=ppt/notesSlides/notesSlide2.xml><?xml version="1.0" encoding="utf-8"?>
+<p:notes xmlns:a="http://schemas.openxmlformats.org/drawingml/2006/main" xmlns:r="http://schemas.openxmlformats.org/officeDocument/2006/relationships" xmlns:p="http://schemas.openxmlformats.org/presentationml/2006/main">
+  <p:cSld>
+    <p:spTree>
+      <p:nvGrpSpPr>
+        <p:cNvPr id="1" name=""/>
+        <p:cNvGrpSpPr/>
+        <p:nvPr/>
+      </p:nvGrpSpPr>
+      <p:grpSpPr>
+        <a:xfrm>
+          <a:off x="0" y="0"/>
+          <a:ext cx="0" cy="0"/>
+          <a:chOff x="0" y="0"/>
+          <a:chExt cx="0" cy="0"/>
+        </a:xfrm>
+      </p:grpSpPr>
+      <p:sp>
+        <p:nvSpPr>
+          <p:cNvPr id="2" name="Espaço Reservado para Imagem de Slide 1"/>
+          <p:cNvSpPr>
+            <a:spLocks noGrp="1" noRot="1" noChangeAspect="1"/>
+          </p:cNvSpPr>
+          <p:nvPr>
+            <p:ph type="sldImg"/>
+          </p:nvPr>
+        </p:nvSpPr>
+        <p:spPr/>
+      </p:sp>
+      <p:sp>
+        <p:nvSpPr>
+          <p:cNvPr id="3" name="Espaço Reservado para Anotações 2"/>
+          <p:cNvSpPr>
+            <a:spLocks noGrp="1"/>
+          </p:cNvSpPr>
+          <p:nvPr>
+            <p:ph type="body" idx="1"/>
+          </p:nvPr>
+        </p:nvSpPr>
+        <p:spPr/>
+        <p:txBody>
+          <a:bodyPr/>
+          <a:lstStyle/>
+          <a:p>
+            <a:r>
+              <a:rPr lang="pt-BR" b="1" dirty="0" smtClean="0"/>
+              <a:t>Cabeçalho:</a:t>
+            </a:r>
+            <a:r>
+              <a:rPr lang="pt-BR" baseline="0" dirty="0" smtClean="0"/>
+              <a:t/>
+            </a:r>
+            <a:br>
+              <a:rPr lang="pt-BR" baseline="0" dirty="0" smtClean="0"/>
+            </a:br>
+            <a:r>
+              <a:rPr lang="pt-BR" baseline="0" dirty="0" smtClean="0"/>
+              <a:t>-Menu</a:t>
+            </a:r>
+          </a:p>
+          <a:p>
+            <a:r>
+              <a:rPr lang="pt-BR" baseline="0" dirty="0" smtClean="0"/>
+              <a:t>-Logo do sistema</a:t>
+            </a:r>
+          </a:p>
+          <a:p>
+            <a:r>
+              <a:rPr lang="pt-BR" baseline="0" dirty="0" smtClean="0"/>
+              <a:t>-Alertas / notificações</a:t>
+            </a:r>
+          </a:p>
+          <a:p>
+            <a:r>
+              <a:rPr lang="pt-BR" baseline="0" dirty="0" smtClean="0"/>
+              <a:t>-Identificação do usuário e a empresa à qual pertence</a:t>
+            </a:r>
+          </a:p>
+          <a:p>
+            <a:pPr marL="0" marR="0" indent="0" algn="l" defTabSz="914400" rtl="0" eaLnBrk="1" fontAlgn="auto" latinLnBrk="0" hangingPunct="1">
+              <a:lnSpc>
+                <a:spcPct val="100000"/>
+              </a:lnSpc>
+              <a:spcBef>
+                <a:spcPts val="0"/>
+              </a:spcBef>
+              <a:spcAft>
+                <a:spcPts val="0"/>
+              </a:spcAft>
+              <a:buClrTx/>
+              <a:buSzTx/>
+              <a:buFontTx/>
+              <a:buNone/>
+              <a:tabLst/>
+              <a:defRPr/>
+            </a:pPr>
+            <a:r>
+              <a:rPr lang="pt-BR" dirty="0" smtClean="0"/>
+              <a:t>-Colar</a:t>
+            </a:r>
+            <a:r>
+              <a:rPr lang="pt-BR" baseline="0" dirty="0" smtClean="0"/>
+              <a:t> Trilha de navegação do usuário</a:t>
+            </a:r>
+          </a:p>
+          <a:p>
+            <a:pPr marL="0" marR="0" indent="0" algn="l" defTabSz="914400" rtl="0" eaLnBrk="1" fontAlgn="auto" latinLnBrk="0" hangingPunct="1">
+              <a:lnSpc>
+                <a:spcPct val="100000"/>
+              </a:lnSpc>
+              <a:spcBef>
+                <a:spcPts val="0"/>
+              </a:spcBef>
+              <a:spcAft>
+                <a:spcPts val="0"/>
+              </a:spcAft>
+              <a:buClrTx/>
+              <a:buSzTx/>
+              <a:buFontTx/>
+              <a:buNone/>
+              <a:tabLst/>
+              <a:defRPr/>
+            </a:pPr>
+            <a:endParaRPr lang="pt-BR" sz="1200" b="1" i="0" kern="1200" baseline="0" dirty="0" smtClean="0">
+              <a:solidFill>
+                <a:schemeClr val="tx1"/>
+              </a:solidFill>
+              <a:effectLst/>
+              <a:latin typeface="+mn-lt"/>
+              <a:ea typeface="+mn-ea"/>
+              <a:cs typeface="+mn-cs"/>
+            </a:endParaRPr>
+          </a:p>
+          <a:p>
+            <a:pPr marL="0" marR="0" indent="0" algn="l" defTabSz="914400" rtl="0" eaLnBrk="1" fontAlgn="auto" latinLnBrk="0" hangingPunct="1">
+              <a:lnSpc>
+                <a:spcPct val="100000"/>
+              </a:lnSpc>
+              <a:spcBef>
+                <a:spcPts val="0"/>
+              </a:spcBef>
+              <a:spcAft>
+                <a:spcPts val="0"/>
+              </a:spcAft>
+              <a:buClrTx/>
+              <a:buSzTx/>
+              <a:buFontTx/>
+              <a:buNone/>
+              <a:tabLst/>
+              <a:defRPr/>
+            </a:pPr>
+            <a:r>
+              <a:rPr lang="pt-BR" sz="1200" b="1" i="0" kern="1200" dirty="0" smtClean="0">
+                <a:solidFill>
+                  <a:schemeClr val="tx1"/>
+                </a:solidFill>
+                <a:effectLst/>
+                <a:latin typeface="+mn-lt"/>
+                <a:ea typeface="+mn-ea"/>
+                <a:cs typeface="+mn-cs"/>
+              </a:rPr>
+              <a:t>Menu:</a:t>
+            </a:r>
+          </a:p>
+          <a:p>
+            <a:pPr marL="0" marR="0" indent="0" algn="l" defTabSz="914400" rtl="0" eaLnBrk="1" fontAlgn="auto" latinLnBrk="0" hangingPunct="1">
+              <a:lnSpc>
+                <a:spcPct val="100000"/>
+              </a:lnSpc>
+              <a:spcBef>
+                <a:spcPts val="0"/>
+              </a:spcBef>
+              <a:spcAft>
+                <a:spcPts val="0"/>
+              </a:spcAft>
+              <a:buClrTx/>
+              <a:buSzTx/>
+              <a:buFontTx/>
+              <a:buNone/>
+              <a:tabLst/>
+              <a:defRPr/>
+            </a:pPr>
+            <a:r>
+              <a:rPr lang="pt-BR" sz="1200" b="0" i="0" kern="1200" dirty="0" smtClean="0">
+                <a:solidFill>
+                  <a:schemeClr val="tx1"/>
+                </a:solidFill>
+                <a:effectLst/>
+                <a:latin typeface="+mn-lt"/>
+                <a:ea typeface="+mn-ea"/>
+                <a:cs typeface="+mn-cs"/>
+              </a:rPr>
+              <a:t>-Ter somente os módulos que o usuário pode acessar / utilizar</a:t>
+            </a:r>
+            <a:r>
+              <a:rPr lang="pt-BR" sz="1200" b="0" i="0" kern="1200" baseline="0" dirty="0" smtClean="0">
+                <a:solidFill>
+                  <a:schemeClr val="tx1"/>
+                </a:solidFill>
+                <a:effectLst/>
+                <a:latin typeface="+mn-lt"/>
+                <a:ea typeface="+mn-ea"/>
+                <a:cs typeface="+mn-cs"/>
+              </a:rPr>
+              <a:t> .</a:t>
+            </a:r>
+            <a:endParaRPr lang="pt-BR" sz="1200" b="0" i="0" kern="1200" dirty="0" smtClean="0">
+              <a:solidFill>
+                <a:schemeClr val="tx1"/>
+              </a:solidFill>
+              <a:effectLst/>
+              <a:latin typeface="+mn-lt"/>
+              <a:ea typeface="+mn-ea"/>
+              <a:cs typeface="+mn-cs"/>
+            </a:endParaRPr>
+          </a:p>
+          <a:p>
+            <a:pPr marL="0" marR="0" indent="0" algn="l" defTabSz="914400" rtl="0" eaLnBrk="1" fontAlgn="auto" latinLnBrk="0" hangingPunct="1">
+              <a:lnSpc>
+                <a:spcPct val="100000"/>
+              </a:lnSpc>
+              <a:spcBef>
+                <a:spcPts val="0"/>
+              </a:spcBef>
+              <a:spcAft>
+                <a:spcPts val="0"/>
+              </a:spcAft>
+              <a:buClrTx/>
+              <a:buSzTx/>
+              <a:buFontTx/>
+              <a:buNone/>
+              <a:tabLst/>
+              <a:defRPr/>
+            </a:pPr>
+            <a:endParaRPr lang="pt-BR" sz="1200" b="1" i="0" kern="1200" dirty="0" smtClean="0">
+              <a:solidFill>
+                <a:schemeClr val="tx1"/>
+              </a:solidFill>
+              <a:effectLst/>
+              <a:latin typeface="+mn-lt"/>
+              <a:ea typeface="+mn-ea"/>
+              <a:cs typeface="+mn-cs"/>
+            </a:endParaRPr>
+          </a:p>
+          <a:p>
+            <a:pPr marL="0" marR="0" indent="0" algn="l" defTabSz="914400" rtl="0" eaLnBrk="1" fontAlgn="auto" latinLnBrk="0" hangingPunct="1">
+              <a:lnSpc>
+                <a:spcPct val="100000"/>
+              </a:lnSpc>
+              <a:spcBef>
+                <a:spcPts val="0"/>
+              </a:spcBef>
+              <a:spcAft>
+                <a:spcPts val="0"/>
+              </a:spcAft>
+              <a:buClrTx/>
+              <a:buSzTx/>
+              <a:buFontTx/>
+              <a:buNone/>
+              <a:tabLst/>
+              <a:defRPr/>
+            </a:pPr>
+            <a:r>
+              <a:rPr lang="pt-BR" sz="1200" b="1" i="0" kern="1200" dirty="0" smtClean="0">
+                <a:solidFill>
+                  <a:schemeClr val="tx1"/>
+                </a:solidFill>
+                <a:effectLst/>
+                <a:latin typeface="+mn-lt"/>
+                <a:ea typeface="+mn-ea"/>
+                <a:cs typeface="+mn-cs"/>
+              </a:rPr>
+              <a:t>Conteúdo</a:t>
+            </a:r>
+            <a:r>
+              <a:rPr lang="pt-BR" sz="1200" b="1" i="0" kern="1200" baseline="0" dirty="0" smtClean="0">
+                <a:solidFill>
+                  <a:schemeClr val="tx1"/>
+                </a:solidFill>
+                <a:effectLst/>
+                <a:latin typeface="+mn-lt"/>
+                <a:ea typeface="+mn-ea"/>
+                <a:cs typeface="+mn-cs"/>
+              </a:rPr>
+              <a:t>:</a:t>
+            </a:r>
+          </a:p>
+          <a:p>
+            <a:pPr marL="0" marR="0" indent="0" algn="l" defTabSz="914400" rtl="0" eaLnBrk="1" fontAlgn="auto" latinLnBrk="0" hangingPunct="1">
+              <a:lnSpc>
+                <a:spcPct val="100000"/>
+              </a:lnSpc>
+              <a:spcBef>
+                <a:spcPts val="0"/>
+              </a:spcBef>
+              <a:spcAft>
+                <a:spcPts val="0"/>
+              </a:spcAft>
+              <a:buClrTx/>
+              <a:buSzTx/>
+              <a:buFontTx/>
+              <a:buNone/>
+              <a:tabLst/>
+              <a:defRPr/>
+            </a:pPr>
+            <a:r>
+              <a:rPr lang="pt-BR" sz="1200" b="0" i="0" kern="1200" baseline="0" dirty="0" smtClean="0">
+                <a:solidFill>
+                  <a:schemeClr val="tx1"/>
+                </a:solidFill>
+                <a:effectLst/>
+                <a:latin typeface="+mn-lt"/>
+                <a:ea typeface="+mn-ea"/>
+                <a:cs typeface="+mn-cs"/>
+              </a:rPr>
+              <a:t>Apresentação dos elementos do módulo. O mais simples possível e à medida que for necessário mais elementos, eles serão apresentados.</a:t>
+            </a:r>
+          </a:p>
+          <a:p>
+            <a:pPr marL="0" marR="0" indent="0" algn="l" defTabSz="914400" rtl="0" eaLnBrk="1" fontAlgn="auto" latinLnBrk="0" hangingPunct="1">
+              <a:lnSpc>
+                <a:spcPct val="100000"/>
+              </a:lnSpc>
+              <a:spcBef>
+                <a:spcPts val="0"/>
+              </a:spcBef>
+              <a:spcAft>
+                <a:spcPts val="0"/>
+              </a:spcAft>
+              <a:buClrTx/>
+              <a:buSzTx/>
+              <a:buFontTx/>
+              <a:buNone/>
+              <a:tabLst/>
+              <a:defRPr/>
+            </a:pPr>
+            <a:r>
+              <a:rPr lang="pt-BR" sz="1200" b="0" i="0" kern="1200" baseline="0" dirty="0" smtClean="0">
+                <a:solidFill>
+                  <a:schemeClr val="tx1"/>
+                </a:solidFill>
+                <a:effectLst/>
+                <a:latin typeface="+mn-lt"/>
+                <a:ea typeface="+mn-ea"/>
+                <a:cs typeface="+mn-cs"/>
+              </a:rPr>
+              <a:t>Única seção que </a:t>
+            </a:r>
+            <a:r>
+              <a:rPr lang="pt-BR" sz="1200" b="0" i="0" kern="1200" baseline="0" dirty="0" err="1" smtClean="0">
+                <a:solidFill>
+                  <a:schemeClr val="tx1"/>
+                </a:solidFill>
+                <a:effectLst/>
+                <a:latin typeface="+mn-lt"/>
+                <a:ea typeface="+mn-ea"/>
+                <a:cs typeface="+mn-cs"/>
+              </a:rPr>
+              <a:t>scrolável</a:t>
+            </a:r>
+            <a:r>
+              <a:rPr lang="pt-BR" sz="1200" b="0" i="0" kern="1200" baseline="0" dirty="0" smtClean="0">
+                <a:solidFill>
+                  <a:schemeClr val="tx1"/>
+                </a:solidFill>
+                <a:effectLst/>
+                <a:latin typeface="+mn-lt"/>
+                <a:ea typeface="+mn-ea"/>
+                <a:cs typeface="+mn-cs"/>
+              </a:rPr>
+              <a:t> , só que o mínimo possível.</a:t>
+            </a:r>
+          </a:p>
+          <a:p>
+            <a:pPr marL="0" marR="0" indent="0" algn="l" defTabSz="914400" rtl="0" eaLnBrk="1" fontAlgn="auto" latinLnBrk="0" hangingPunct="1">
+              <a:lnSpc>
+                <a:spcPct val="100000"/>
+              </a:lnSpc>
+              <a:spcBef>
+                <a:spcPts val="0"/>
+              </a:spcBef>
+              <a:spcAft>
+                <a:spcPts val="0"/>
+              </a:spcAft>
+              <a:buClrTx/>
+              <a:buSzTx/>
+              <a:buFontTx/>
+              <a:buNone/>
+              <a:tabLst/>
+              <a:defRPr/>
+            </a:pPr>
+            <a:endParaRPr lang="pt-BR" sz="1200" b="0" i="0" kern="1200" baseline="0" dirty="0" smtClean="0">
+              <a:solidFill>
+                <a:schemeClr val="tx1"/>
+              </a:solidFill>
+              <a:effectLst/>
+              <a:latin typeface="+mn-lt"/>
+              <a:ea typeface="+mn-ea"/>
+              <a:cs typeface="+mn-cs"/>
+            </a:endParaRPr>
+          </a:p>
+          <a:p>
+            <a:pPr marL="0" marR="0" indent="0" algn="l" defTabSz="914400" rtl="0" eaLnBrk="1" fontAlgn="auto" latinLnBrk="0" hangingPunct="1">
+              <a:lnSpc>
+                <a:spcPct val="100000"/>
+              </a:lnSpc>
+              <a:spcBef>
+                <a:spcPts val="0"/>
+              </a:spcBef>
+              <a:spcAft>
+                <a:spcPts val="0"/>
+              </a:spcAft>
+              <a:buClrTx/>
+              <a:buSzTx/>
+              <a:buFontTx/>
+              <a:buNone/>
+              <a:tabLst/>
+              <a:defRPr/>
+            </a:pPr>
+            <a:r>
+              <a:rPr lang="pt-BR" sz="1200" b="1" i="0" kern="1200" baseline="0" dirty="0" smtClean="0">
+                <a:solidFill>
+                  <a:schemeClr val="tx1"/>
+                </a:solidFill>
+                <a:effectLst/>
+                <a:latin typeface="+mn-lt"/>
+                <a:ea typeface="+mn-ea"/>
+                <a:cs typeface="+mn-cs"/>
+              </a:rPr>
+              <a:t>Rodapé:</a:t>
+            </a:r>
+          </a:p>
+          <a:p>
+            <a:pPr marL="0" marR="0" indent="0" algn="l" defTabSz="914400" rtl="0" eaLnBrk="1" fontAlgn="auto" latinLnBrk="0" hangingPunct="1">
+              <a:lnSpc>
+                <a:spcPct val="100000"/>
+              </a:lnSpc>
+              <a:spcBef>
+                <a:spcPts val="0"/>
+              </a:spcBef>
+              <a:spcAft>
+                <a:spcPts val="0"/>
+              </a:spcAft>
+              <a:buClrTx/>
+              <a:buSzTx/>
+              <a:buFontTx/>
+              <a:buNone/>
+              <a:tabLst/>
+              <a:defRPr/>
+            </a:pPr>
+            <a:r>
+              <a:rPr lang="pt-BR" sz="1200" b="0" i="0" kern="1200" dirty="0" smtClean="0">
+                <a:solidFill>
+                  <a:schemeClr val="tx1"/>
+                </a:solidFill>
+                <a:effectLst/>
+                <a:latin typeface="+mn-lt"/>
+                <a:ea typeface="+mn-ea"/>
+                <a:cs typeface="+mn-cs"/>
+              </a:rPr>
+              <a:t>Informações sobre a empresa desenvolvedora, tais como contatos e etc.</a:t>
+            </a:r>
+          </a:p>
+          <a:p>
+            <a:pPr marL="0" marR="0" indent="0" algn="l" defTabSz="914400" rtl="0" eaLnBrk="1" fontAlgn="auto" latinLnBrk="0" hangingPunct="1">
+              <a:lnSpc>
+                <a:spcPct val="100000"/>
+              </a:lnSpc>
+              <a:spcBef>
+                <a:spcPts val="0"/>
+              </a:spcBef>
+              <a:spcAft>
+                <a:spcPts val="0"/>
+              </a:spcAft>
+              <a:buClrTx/>
+              <a:buSzTx/>
+              <a:buFontTx/>
+              <a:buNone/>
+              <a:tabLst/>
+              <a:defRPr/>
+            </a:pPr>
+            <a:r>
+              <a:rPr lang="pt-BR" sz="1200" b="0" i="0" kern="1200" dirty="0" smtClean="0">
+                <a:solidFill>
+                  <a:schemeClr val="tx1"/>
+                </a:solidFill>
+                <a:effectLst/>
+                <a:latin typeface="+mn-lt"/>
+                <a:ea typeface="+mn-ea"/>
+                <a:cs typeface="+mn-cs"/>
+              </a:rPr>
+              <a:t>Informações sobre a empresa cliente do sistema.</a:t>
+            </a:r>
+          </a:p>
+        </p:txBody>
+      </p:sp>
+      <p:sp>
+        <p:nvSpPr>
+          <p:cNvPr id="4" name="Espaço Reservado para Número de Slide 3"/>
+          <p:cNvSpPr>
+            <a:spLocks noGrp="1"/>
+          </p:cNvSpPr>
+          <p:nvPr>
+            <p:ph type="sldNum" sz="quarter" idx="10"/>
+          </p:nvPr>
+        </p:nvSpPr>
+        <p:spPr/>
+        <p:txBody>
+          <a:bodyPr/>
+          <a:lstStyle/>
+          <a:p>
+            <a:fld id="{97E31263-D404-4F6F-81C3-433A5ED169C5}" type="slidenum">
+              <a:rPr lang="pt-BR" smtClean="0"/>
+              <a:t>3</a:t>
+            </a:fld>
+            <a:endParaRPr lang="pt-BR" dirty="0"/>
+          </a:p>
+        </p:txBody>
+      </p:sp>
+    </p:spTree>
+    <p:extLst>
+      <p:ext uri="{BB962C8B-B14F-4D97-AF65-F5344CB8AC3E}">
+        <p14:creationId xmlns:p14="http://schemas.microsoft.com/office/powerpoint/2010/main" val="1393650944"/>
+      </p:ext>
+    </p:extLst>
+  </p:cSld>
+  <p:clrMapOvr>
+    <a:masterClrMapping/>
+  </p:clrMapOvr>
+</p:notes>
+</file>
+
 <file path=ppt/slideLayouts/slideLayout1.xml><?xml version="1.0" encoding="utf-8"?>
 <p:sldLayout xmlns:a="http://schemas.openxmlformats.org/drawingml/2006/main" xmlns:r="http://schemas.openxmlformats.org/officeDocument/2006/relationships" xmlns:p="http://schemas.openxmlformats.org/presentationml/2006/main" type="title" preserve="1">
   <p:cSld name="Slide de título">
@@ -727,7 +1261,7 @@
           <a:p>
             <a:fld id="{44B8A51E-3842-4EAC-866C-3A2CB7D1A4DA}" type="datetimeFigureOut">
               <a:rPr lang="pt-BR" smtClean="0"/>
-              <a:t>29/05/2023</a:t>
+              <a:t>30/05/2023</a:t>
             </a:fld>
             <a:endParaRPr lang="pt-BR" dirty="0"/>
           </a:p>
@@ -897,7 +1431,7 @@
           <a:p>
             <a:fld id="{44B8A51E-3842-4EAC-866C-3A2CB7D1A4DA}" type="datetimeFigureOut">
               <a:rPr lang="pt-BR" smtClean="0"/>
-              <a:t>29/05/2023</a:t>
+              <a:t>30/05/2023</a:t>
             </a:fld>
             <a:endParaRPr lang="pt-BR" dirty="0"/>
           </a:p>
@@ -1077,7 +1611,7 @@
           <a:p>
             <a:fld id="{44B8A51E-3842-4EAC-866C-3A2CB7D1A4DA}" type="datetimeFigureOut">
               <a:rPr lang="pt-BR" smtClean="0"/>
-              <a:t>29/05/2023</a:t>
+              <a:t>30/05/2023</a:t>
             </a:fld>
             <a:endParaRPr lang="pt-BR" dirty="0"/>
           </a:p>
@@ -1247,7 +1781,7 @@
           <a:p>
             <a:fld id="{44B8A51E-3842-4EAC-866C-3A2CB7D1A4DA}" type="datetimeFigureOut">
               <a:rPr lang="pt-BR" smtClean="0"/>
-              <a:t>29/05/2023</a:t>
+              <a:t>30/05/2023</a:t>
             </a:fld>
             <a:endParaRPr lang="pt-BR" dirty="0"/>
           </a:p>
@@ -1493,7 +2027,7 @@
           <a:p>
             <a:fld id="{44B8A51E-3842-4EAC-866C-3A2CB7D1A4DA}" type="datetimeFigureOut">
               <a:rPr lang="pt-BR" smtClean="0"/>
-              <a:t>29/05/2023</a:t>
+              <a:t>30/05/2023</a:t>
             </a:fld>
             <a:endParaRPr lang="pt-BR" dirty="0"/>
           </a:p>
@@ -1781,7 +2315,7 @@
           <a:p>
             <a:fld id="{44B8A51E-3842-4EAC-866C-3A2CB7D1A4DA}" type="datetimeFigureOut">
               <a:rPr lang="pt-BR" smtClean="0"/>
-              <a:t>29/05/2023</a:t>
+              <a:t>30/05/2023</a:t>
             </a:fld>
             <a:endParaRPr lang="pt-BR" dirty="0"/>
           </a:p>
@@ -2203,7 +2737,7 @@
           <a:p>
             <a:fld id="{44B8A51E-3842-4EAC-866C-3A2CB7D1A4DA}" type="datetimeFigureOut">
               <a:rPr lang="pt-BR" smtClean="0"/>
-              <a:t>29/05/2023</a:t>
+              <a:t>30/05/2023</a:t>
             </a:fld>
             <a:endParaRPr lang="pt-BR" dirty="0"/>
           </a:p>
@@ -2321,7 +2855,7 @@
           <a:p>
             <a:fld id="{44B8A51E-3842-4EAC-866C-3A2CB7D1A4DA}" type="datetimeFigureOut">
               <a:rPr lang="pt-BR" smtClean="0"/>
-              <a:t>29/05/2023</a:t>
+              <a:t>30/05/2023</a:t>
             </a:fld>
             <a:endParaRPr lang="pt-BR" dirty="0"/>
           </a:p>
@@ -2416,7 +2950,7 @@
           <a:p>
             <a:fld id="{44B8A51E-3842-4EAC-866C-3A2CB7D1A4DA}" type="datetimeFigureOut">
               <a:rPr lang="pt-BR" smtClean="0"/>
-              <a:t>29/05/2023</a:t>
+              <a:t>30/05/2023</a:t>
             </a:fld>
             <a:endParaRPr lang="pt-BR" dirty="0"/>
           </a:p>
@@ -2700,7 +3234,7 @@
           <a:p>
             <a:fld id="{44B8A51E-3842-4EAC-866C-3A2CB7D1A4DA}" type="datetimeFigureOut">
               <a:rPr lang="pt-BR" smtClean="0"/>
-              <a:t>29/05/2023</a:t>
+              <a:t>30/05/2023</a:t>
             </a:fld>
             <a:endParaRPr lang="pt-BR" dirty="0"/>
           </a:p>
@@ -2953,7 +3487,7 @@
           <a:p>
             <a:fld id="{44B8A51E-3842-4EAC-866C-3A2CB7D1A4DA}" type="datetimeFigureOut">
               <a:rPr lang="pt-BR" smtClean="0"/>
-              <a:t>29/05/2023</a:t>
+              <a:t>30/05/2023</a:t>
             </a:fld>
             <a:endParaRPr lang="pt-BR" dirty="0"/>
           </a:p>
@@ -3166,7 +3700,7 @@
           <a:p>
             <a:fld id="{44B8A51E-3842-4EAC-866C-3A2CB7D1A4DA}" type="datetimeFigureOut">
               <a:rPr lang="pt-BR" smtClean="0"/>
-              <a:t>29/05/2023</a:t>
+              <a:t>30/05/2023</a:t>
             </a:fld>
             <a:endParaRPr lang="pt-BR" dirty="0"/>
           </a:p>
@@ -3822,6 +4356,425 @@
           <a:chExt cx="0" cy="0"/>
         </a:xfrm>
       </p:grpSpPr>
+      <p:sp>
+        <p:nvSpPr>
+          <p:cNvPr id="2" name="CaixaDeTexto 1"/>
+          <p:cNvSpPr txBox="1"/>
+          <p:nvPr/>
+        </p:nvSpPr>
+        <p:spPr>
+          <a:xfrm>
+            <a:off x="6422" y="-27384"/>
+            <a:ext cx="2405338" cy="369332"/>
+          </a:xfrm>
+          <a:prstGeom prst="rect">
+            <a:avLst/>
+          </a:prstGeom>
+          <a:noFill/>
+        </p:spPr>
+        <p:txBody>
+          <a:bodyPr wrap="none" rtlCol="0">
+            <a:spAutoFit/>
+          </a:bodyPr>
+          <a:lstStyle/>
+          <a:p>
+            <a:r>
+              <a:rPr lang="pt-BR" dirty="0" smtClean="0"/>
+              <a:t>Layout geral do Sistema</a:t>
+            </a:r>
+            <a:endParaRPr lang="pt-BR" dirty="0"/>
+          </a:p>
+        </p:txBody>
+      </p:sp>
+      <p:sp>
+        <p:nvSpPr>
+          <p:cNvPr id="3" name="Retângulo 2"/>
+          <p:cNvSpPr/>
+          <p:nvPr/>
+        </p:nvSpPr>
+        <p:spPr>
+          <a:xfrm>
+            <a:off x="6422" y="341948"/>
+            <a:ext cx="9137578" cy="782796"/>
+          </a:xfrm>
+          <a:prstGeom prst="rect">
+            <a:avLst/>
+          </a:prstGeom>
+        </p:spPr>
+        <p:style>
+          <a:lnRef idx="2">
+            <a:schemeClr val="accent1">
+              <a:shade val="50000"/>
+            </a:schemeClr>
+          </a:lnRef>
+          <a:fillRef idx="1">
+            <a:schemeClr val="accent1"/>
+          </a:fillRef>
+          <a:effectRef idx="0">
+            <a:schemeClr val="accent1"/>
+          </a:effectRef>
+          <a:fontRef idx="minor">
+            <a:schemeClr val="lt1"/>
+          </a:fontRef>
+        </p:style>
+        <p:txBody>
+          <a:bodyPr rtlCol="0" anchor="ctr"/>
+          <a:lstStyle/>
+          <a:p>
+            <a:pPr algn="ctr"/>
+            <a:endParaRPr lang="pt-BR"/>
+          </a:p>
+        </p:txBody>
+      </p:sp>
+      <p:sp>
+        <p:nvSpPr>
+          <p:cNvPr id="5" name="Retângulo 4"/>
+          <p:cNvSpPr/>
+          <p:nvPr/>
+        </p:nvSpPr>
+        <p:spPr>
+          <a:xfrm>
+            <a:off x="6422" y="6381328"/>
+            <a:ext cx="9137578" cy="476672"/>
+          </a:xfrm>
+          <a:prstGeom prst="rect">
+            <a:avLst/>
+          </a:prstGeom>
+        </p:spPr>
+        <p:style>
+          <a:lnRef idx="2">
+            <a:schemeClr val="accent1">
+              <a:shade val="50000"/>
+            </a:schemeClr>
+          </a:lnRef>
+          <a:fillRef idx="1">
+            <a:schemeClr val="accent1"/>
+          </a:fillRef>
+          <a:effectRef idx="0">
+            <a:schemeClr val="accent1"/>
+          </a:effectRef>
+          <a:fontRef idx="minor">
+            <a:schemeClr val="lt1"/>
+          </a:fontRef>
+        </p:style>
+        <p:txBody>
+          <a:bodyPr rtlCol="0" anchor="ctr"/>
+          <a:lstStyle/>
+          <a:p>
+            <a:pPr algn="ctr"/>
+            <a:endParaRPr lang="pt-BR"/>
+          </a:p>
+        </p:txBody>
+      </p:sp>
+      <p:sp>
+        <p:nvSpPr>
+          <p:cNvPr id="6" name="Retângulo 5"/>
+          <p:cNvSpPr/>
+          <p:nvPr/>
+        </p:nvSpPr>
+        <p:spPr>
+          <a:xfrm>
+            <a:off x="6422" y="1196752"/>
+            <a:ext cx="1037186" cy="5112568"/>
+          </a:xfrm>
+          <a:prstGeom prst="rect">
+            <a:avLst/>
+          </a:prstGeom>
+        </p:spPr>
+        <p:style>
+          <a:lnRef idx="2">
+            <a:schemeClr val="accent1">
+              <a:shade val="50000"/>
+            </a:schemeClr>
+          </a:lnRef>
+          <a:fillRef idx="1">
+            <a:schemeClr val="accent1"/>
+          </a:fillRef>
+          <a:effectRef idx="0">
+            <a:schemeClr val="accent1"/>
+          </a:effectRef>
+          <a:fontRef idx="minor">
+            <a:schemeClr val="lt1"/>
+          </a:fontRef>
+        </p:style>
+        <p:txBody>
+          <a:bodyPr rtlCol="0" anchor="ctr"/>
+          <a:lstStyle/>
+          <a:p>
+            <a:pPr algn="ctr"/>
+            <a:endParaRPr lang="pt-BR"/>
+          </a:p>
+        </p:txBody>
+      </p:sp>
+      <p:sp>
+        <p:nvSpPr>
+          <p:cNvPr id="7" name="Retângulo 6"/>
+          <p:cNvSpPr/>
+          <p:nvPr/>
+        </p:nvSpPr>
+        <p:spPr>
+          <a:xfrm>
+            <a:off x="1115616" y="1196752"/>
+            <a:ext cx="7934909" cy="5112568"/>
+          </a:xfrm>
+          <a:prstGeom prst="rect">
+            <a:avLst/>
+          </a:prstGeom>
+        </p:spPr>
+        <p:style>
+          <a:lnRef idx="2">
+            <a:schemeClr val="accent1">
+              <a:shade val="50000"/>
+            </a:schemeClr>
+          </a:lnRef>
+          <a:fillRef idx="1">
+            <a:schemeClr val="accent1"/>
+          </a:fillRef>
+          <a:effectRef idx="0">
+            <a:schemeClr val="accent1"/>
+          </a:effectRef>
+          <a:fontRef idx="minor">
+            <a:schemeClr val="lt1"/>
+          </a:fontRef>
+        </p:style>
+        <p:txBody>
+          <a:bodyPr rtlCol="0" anchor="ctr"/>
+          <a:lstStyle/>
+          <a:p>
+            <a:pPr algn="ctr"/>
+            <a:endParaRPr lang="pt-BR"/>
+          </a:p>
+        </p:txBody>
+      </p:sp>
+      <p:sp>
+        <p:nvSpPr>
+          <p:cNvPr id="8" name="CaixaDeTexto 7"/>
+          <p:cNvSpPr txBox="1"/>
+          <p:nvPr/>
+        </p:nvSpPr>
+        <p:spPr>
+          <a:xfrm>
+            <a:off x="3131840" y="548680"/>
+            <a:ext cx="2664296" cy="461665"/>
+          </a:xfrm>
+          <a:prstGeom prst="rect">
+            <a:avLst/>
+          </a:prstGeom>
+          <a:noFill/>
+        </p:spPr>
+        <p:txBody>
+          <a:bodyPr wrap="square" rtlCol="0">
+            <a:spAutoFit/>
+          </a:bodyPr>
+          <a:lstStyle/>
+          <a:p>
+            <a:pPr algn="ctr"/>
+            <a:r>
+              <a:rPr lang="pt-PT" sz="2400" b="1" dirty="0" smtClean="0">
+                <a:solidFill>
+                  <a:schemeClr val="bg1"/>
+                </a:solidFill>
+              </a:rPr>
+              <a:t>CABEÇALHO</a:t>
+            </a:r>
+            <a:r>
+              <a:rPr lang="pt-PT" sz="1600" b="1" dirty="0" smtClean="0">
+                <a:solidFill>
+                  <a:schemeClr val="bg1"/>
+                </a:solidFill>
+              </a:rPr>
+              <a:t>(fixo)</a:t>
+            </a:r>
+            <a:endParaRPr lang="pt-BR" sz="2400" b="1" dirty="0">
+              <a:solidFill>
+                <a:schemeClr val="bg1"/>
+              </a:solidFill>
+            </a:endParaRPr>
+          </a:p>
+        </p:txBody>
+      </p:sp>
+      <p:sp>
+        <p:nvSpPr>
+          <p:cNvPr id="9" name="CaixaDeTexto 8"/>
+          <p:cNvSpPr txBox="1"/>
+          <p:nvPr/>
+        </p:nvSpPr>
+        <p:spPr>
+          <a:xfrm>
+            <a:off x="3059832" y="3284984"/>
+            <a:ext cx="2664296" cy="707886"/>
+          </a:xfrm>
+          <a:prstGeom prst="rect">
+            <a:avLst/>
+          </a:prstGeom>
+          <a:noFill/>
+        </p:spPr>
+        <p:txBody>
+          <a:bodyPr wrap="square" rtlCol="0">
+            <a:spAutoFit/>
+          </a:bodyPr>
+          <a:lstStyle/>
+          <a:p>
+            <a:pPr algn="ctr"/>
+            <a:r>
+              <a:rPr lang="pt-PT" sz="2400" b="1" dirty="0" smtClean="0">
+                <a:solidFill>
+                  <a:schemeClr val="bg1"/>
+                </a:solidFill>
+              </a:rPr>
+              <a:t>CONTEÚDO</a:t>
+            </a:r>
+            <a:endParaRPr lang="pt-PT" sz="1600" b="1" dirty="0" smtClean="0">
+              <a:solidFill>
+                <a:schemeClr val="bg1"/>
+              </a:solidFill>
+            </a:endParaRPr>
+          </a:p>
+          <a:p>
+            <a:pPr algn="ctr"/>
+            <a:r>
+              <a:rPr lang="pt-PT" sz="1600" b="1" dirty="0" smtClean="0">
+                <a:solidFill>
+                  <a:schemeClr val="bg1"/>
+                </a:solidFill>
+              </a:rPr>
+              <a:t>(mínimo scrolável)</a:t>
+            </a:r>
+            <a:endParaRPr lang="pt-BR" sz="2400" b="1" dirty="0">
+              <a:solidFill>
+                <a:schemeClr val="bg1"/>
+              </a:solidFill>
+            </a:endParaRPr>
+          </a:p>
+        </p:txBody>
+      </p:sp>
+      <p:sp>
+        <p:nvSpPr>
+          <p:cNvPr id="10" name="CaixaDeTexto 9"/>
+          <p:cNvSpPr txBox="1"/>
+          <p:nvPr/>
+        </p:nvSpPr>
+        <p:spPr>
+          <a:xfrm>
+            <a:off x="3059832" y="6351711"/>
+            <a:ext cx="2664296" cy="461665"/>
+          </a:xfrm>
+          <a:prstGeom prst="rect">
+            <a:avLst/>
+          </a:prstGeom>
+          <a:noFill/>
+        </p:spPr>
+        <p:txBody>
+          <a:bodyPr wrap="square" rtlCol="0">
+            <a:spAutoFit/>
+          </a:bodyPr>
+          <a:lstStyle/>
+          <a:p>
+            <a:pPr algn="ctr"/>
+            <a:r>
+              <a:rPr lang="pt-PT" sz="2400" b="1" dirty="0" smtClean="0">
+                <a:solidFill>
+                  <a:schemeClr val="bg1"/>
+                </a:solidFill>
+              </a:rPr>
+              <a:t>RODAPÉ</a:t>
+            </a:r>
+            <a:r>
+              <a:rPr lang="pt-PT" sz="1400" b="1" dirty="0" smtClean="0">
+                <a:solidFill>
+                  <a:schemeClr val="bg1"/>
+                </a:solidFill>
+              </a:rPr>
+              <a:t>(fixo)</a:t>
+            </a:r>
+            <a:endParaRPr lang="pt-BR" sz="2400" b="1" dirty="0">
+              <a:solidFill>
+                <a:schemeClr val="bg1"/>
+              </a:solidFill>
+            </a:endParaRPr>
+          </a:p>
+        </p:txBody>
+      </p:sp>
+      <p:sp>
+        <p:nvSpPr>
+          <p:cNvPr id="11" name="CaixaDeTexto 10"/>
+          <p:cNvSpPr txBox="1"/>
+          <p:nvPr/>
+        </p:nvSpPr>
+        <p:spPr>
+          <a:xfrm>
+            <a:off x="-36512" y="3284984"/>
+            <a:ext cx="1080120" cy="707886"/>
+          </a:xfrm>
+          <a:prstGeom prst="rect">
+            <a:avLst/>
+          </a:prstGeom>
+          <a:noFill/>
+        </p:spPr>
+        <p:txBody>
+          <a:bodyPr wrap="square" rtlCol="0">
+            <a:spAutoFit/>
+          </a:bodyPr>
+          <a:lstStyle/>
+          <a:p>
+            <a:pPr algn="ctr"/>
+            <a:r>
+              <a:rPr lang="pt-PT" sz="2400" b="1" dirty="0" smtClean="0">
+                <a:solidFill>
+                  <a:schemeClr val="bg1"/>
+                </a:solidFill>
+              </a:rPr>
+              <a:t>MENU</a:t>
+            </a:r>
+          </a:p>
+          <a:p>
+            <a:pPr algn="ctr"/>
+            <a:r>
+              <a:rPr lang="pt-PT" sz="1600" b="1" dirty="0" smtClean="0">
+                <a:solidFill>
+                  <a:schemeClr val="bg1"/>
+                </a:solidFill>
+              </a:rPr>
+              <a:t>(ocultável)</a:t>
+            </a:r>
+            <a:endParaRPr lang="pt-BR" sz="2400" b="1" dirty="0">
+              <a:solidFill>
+                <a:schemeClr val="bg1"/>
+              </a:solidFill>
+            </a:endParaRPr>
+          </a:p>
+        </p:txBody>
+      </p:sp>
+    </p:spTree>
+    <p:extLst>
+      <p:ext uri="{BB962C8B-B14F-4D97-AF65-F5344CB8AC3E}">
+        <p14:creationId xmlns:p14="http://schemas.microsoft.com/office/powerpoint/2010/main" val="4260029238"/>
+      </p:ext>
+    </p:extLst>
+  </p:cSld>
+  <p:clrMapOvr>
+    <a:masterClrMapping/>
+  </p:clrMapOvr>
+</p:sld>
+</file>
+
+<file path=ppt/slides/slide4.xml><?xml version="1.0" encoding="utf-8"?>
+<p:sld xmlns:a="http://schemas.openxmlformats.org/drawingml/2006/main" xmlns:r="http://schemas.openxmlformats.org/officeDocument/2006/relationships" xmlns:p="http://schemas.openxmlformats.org/presentationml/2006/main">
+  <p:cSld>
+    <p:spTree>
+      <p:nvGrpSpPr>
+        <p:cNvPr id="1" name=""/>
+        <p:cNvGrpSpPr/>
+        <p:nvPr/>
+      </p:nvGrpSpPr>
+      <p:grpSpPr>
+        <a:xfrm>
+          <a:off x="0" y="0"/>
+          <a:ext cx="0" cy="0"/>
+          <a:chOff x="0" y="0"/>
+          <a:chExt cx="0" cy="0"/>
+        </a:xfrm>
+      </p:grpSpPr>
       <p:pic>
         <p:nvPicPr>
           <p:cNvPr id="3074" name="Picture 2"/>
@@ -3895,7 +4848,7 @@
         <p:spPr>
           <a:xfrm>
             <a:off x="35496" y="5157192"/>
-            <a:ext cx="9001000" cy="923330"/>
+            <a:ext cx="9001000" cy="1200329"/>
           </a:xfrm>
           <a:prstGeom prst="rect">
             <a:avLst/>
@@ -3929,8 +4882,8 @@
               <a:t>. Trazendo visualização/acesso às funcionalidades ao qual ele tem </a:t>
             </a:r>
             <a:r>
-              <a:rPr lang="pt-BR" dirty="0" err="1" smtClean="0"/>
-              <a:t>permissao</a:t>
+              <a:rPr lang="pt-BR" dirty="0" smtClean="0"/>
+              <a:t>permissão</a:t>
             </a:r>
             <a:r>
               <a:rPr lang="pt-BR" dirty="0" smtClean="0"/>
@@ -3940,11 +4893,33 @@
           <a:p>
             <a:r>
               <a:rPr lang="pt-BR" dirty="0" smtClean="0"/>
-              <a:t>Tem que ter uma navegação </a:t>
-            </a:r>
-            <a:r>
-              <a:rPr lang="pt-BR" smtClean="0"/>
-              <a:t>do usuário</a:t>
+              <a:t>Tem que ter </a:t>
+            </a:r>
+            <a:r>
+              <a:rPr lang="pt-BR" dirty="0" smtClean="0"/>
+              <a:t>no cabeçalho a trilha de navegação </a:t>
+            </a:r>
+            <a:r>
+              <a:rPr lang="pt-BR" dirty="0" smtClean="0"/>
+              <a:t>do </a:t>
+            </a:r>
+            <a:r>
+              <a:rPr lang="pt-BR" dirty="0" smtClean="0"/>
+              <a:t>usuário.</a:t>
+            </a:r>
+          </a:p>
+          <a:p>
+            <a:r>
+              <a:rPr lang="pt-BR" dirty="0" smtClean="0"/>
+              <a:t>Tem que ter na seção conteúdo,  os </a:t>
+            </a:r>
+            <a:r>
+              <a:rPr lang="pt-BR" dirty="0" err="1" smtClean="0"/>
+              <a:t>cards</a:t>
+            </a:r>
+            <a:r>
+              <a:rPr lang="pt-BR" dirty="0" smtClean="0"/>
+              <a:t> referentes ao menu de acesso.</a:t>
             </a:r>
             <a:endParaRPr lang="pt-BR" dirty="0" smtClean="0"/>
           </a:p>
@@ -3967,6 +4942,134 @@
       </p:par>
     </p:tnLst>
   </p:timing>
+</p:sld>
+</file>
+
+<file path=ppt/slides/slide5.xml><?xml version="1.0" encoding="utf-8"?>
+<p:sld xmlns:a="http://schemas.openxmlformats.org/drawingml/2006/main" xmlns:r="http://schemas.openxmlformats.org/officeDocument/2006/relationships" xmlns:p="http://schemas.openxmlformats.org/presentationml/2006/main">
+  <p:cSld>
+    <p:spTree>
+      <p:nvGrpSpPr>
+        <p:cNvPr id="1" name=""/>
+        <p:cNvGrpSpPr/>
+        <p:nvPr/>
+      </p:nvGrpSpPr>
+      <p:grpSpPr>
+        <a:xfrm>
+          <a:off x="0" y="0"/>
+          <a:ext cx="0" cy="0"/>
+          <a:chOff x="0" y="0"/>
+          <a:chExt cx="0" cy="0"/>
+        </a:xfrm>
+      </p:grpSpPr>
+      <p:pic>
+        <p:nvPicPr>
+          <p:cNvPr id="1026" name="Picture 2"/>
+          <p:cNvPicPr>
+            <a:picLocks noChangeAspect="1" noChangeArrowheads="1"/>
+          </p:cNvPicPr>
+          <p:nvPr/>
+        </p:nvPicPr>
+        <p:blipFill>
+          <a:blip r:embed="rId2">
+            <a:extLst>
+              <a:ext uri="{28A0092B-C50C-407E-A947-70E740481C1C}">
+                <a14:useLocalDpi xmlns:a14="http://schemas.microsoft.com/office/drawing/2010/main" val="0"/>
+              </a:ext>
+            </a:extLst>
+          </a:blip>
+          <a:srcRect/>
+          <a:stretch>
+            <a:fillRect/>
+          </a:stretch>
+        </p:blipFill>
+        <p:spPr bwMode="auto">
+          <a:xfrm>
+            <a:off x="699" y="35408"/>
+            <a:ext cx="9107805" cy="5120640"/>
+          </a:xfrm>
+          <a:prstGeom prst="rect">
+            <a:avLst/>
+          </a:prstGeom>
+          <a:noFill/>
+          <a:ln>
+            <a:noFill/>
+          </a:ln>
+          <a:effectLst/>
+          <a:extLst>
+            <a:ext uri="{909E8E84-426E-40DD-AFC4-6F175D3DCCD1}">
+              <a14:hiddenFill xmlns:a14="http://schemas.microsoft.com/office/drawing/2010/main">
+                <a:solidFill>
+                  <a:schemeClr val="accent1"/>
+                </a:solidFill>
+              </a14:hiddenFill>
+            </a:ext>
+            <a:ext uri="{91240B29-F687-4F45-9708-019B960494DF}">
+              <a14:hiddenLine xmlns:a14="http://schemas.microsoft.com/office/drawing/2010/main" w="9525">
+                <a:solidFill>
+                  <a:schemeClr val="tx1"/>
+                </a:solidFill>
+                <a:miter lim="800000"/>
+                <a:headEnd/>
+                <a:tailEnd/>
+              </a14:hiddenLine>
+            </a:ext>
+            <a:ext uri="{AF507438-7753-43E0-B8FC-AC1667EBCBE1}">
+              <a14:hiddenEffects xmlns:a14="http://schemas.microsoft.com/office/drawing/2010/main">
+                <a:effectLst>
+                  <a:outerShdw dist="35921" dir="2700000" algn="ctr" rotWithShape="0">
+                    <a:schemeClr val="bg2"/>
+                  </a:outerShdw>
+                </a:effectLst>
+              </a14:hiddenEffects>
+            </a:ext>
+          </a:extLst>
+        </p:spPr>
+      </p:pic>
+      <p:sp>
+        <p:nvSpPr>
+          <p:cNvPr id="2" name="CaixaDeTexto 1"/>
+          <p:cNvSpPr txBox="1"/>
+          <p:nvPr/>
+        </p:nvSpPr>
+        <p:spPr>
+          <a:xfrm>
+            <a:off x="699" y="5156048"/>
+            <a:ext cx="6035948" cy="369332"/>
+          </a:xfrm>
+          <a:prstGeom prst="rect">
+            <a:avLst/>
+          </a:prstGeom>
+          <a:noFill/>
+        </p:spPr>
+        <p:txBody>
+          <a:bodyPr wrap="none" rtlCol="0">
+            <a:spAutoFit/>
+          </a:bodyPr>
+          <a:lstStyle/>
+          <a:p>
+            <a:r>
+              <a:rPr lang="pt-BR" dirty="0" smtClean="0"/>
+              <a:t>Mostrar as opções “Pesquisar paciente”, “</a:t>
+            </a:r>
+            <a:r>
+              <a:rPr lang="pt-BR" smtClean="0"/>
+              <a:t>Cadastrar paciente”, </a:t>
+            </a:r>
+            <a:endParaRPr lang="pt-BR" dirty="0"/>
+          </a:p>
+        </p:txBody>
+      </p:sp>
+    </p:spTree>
+    <p:extLst>
+      <p:ext uri="{BB962C8B-B14F-4D97-AF65-F5344CB8AC3E}">
+        <p14:creationId xmlns:p14="http://schemas.microsoft.com/office/powerpoint/2010/main" val="3386031023"/>
+      </p:ext>
+    </p:extLst>
+  </p:cSld>
+  <p:clrMapOvr>
+    <a:masterClrMapping/>
+  </p:clrMapOvr>
 </p:sld>
 </file>
 

</xml_diff>